<commit_message>
docs: update Advanced Human Machine presentation
</commit_message>
<xml_diff>
--- a/doc/Advanced Human Machine.pptx
+++ b/doc/Advanced Human Machine.pptx
@@ -117,6 +117,11 @@
       </a:defRPr>
     </a:lvl9pPr>
   </p:defaultTextStyle>
+  <p:extLst>
+    <p:ext uri="{EFAFB233-063F-42B5-8137-9DF3F51BA10A}">
+      <p15:sldGuideLst xmlns:p15="http://schemas.microsoft.com/office/powerpoint/2012/main"/>
+    </p:ext>
+  </p:extLst>
 </p:presentation>
 </file>
 
@@ -1380,8 +1385,8 @@
     <dgm:cxn modelId="{7E65FD17-8108-447B-9B7B-294C202F9A98}" type="presOf" srcId="{BEBCE441-F842-4A6A-820E-149A1968DE5D}" destId="{BD599608-3896-4B79-B26A-0F0DB375AEF1}" srcOrd="1" destOrd="0" presId="urn:microsoft.com/office/officeart/2016/7/layout/RepeatingBendingProcessNew"/>
     <dgm:cxn modelId="{588D1F24-9221-4033-8C37-F1B545BC76ED}" type="presOf" srcId="{13A97591-A050-4988-B946-4E81EFB517C1}" destId="{12A6E14B-6DC3-40AD-B65D-596A6A1316A4}" srcOrd="0" destOrd="0" presId="urn:microsoft.com/office/officeart/2016/7/layout/RepeatingBendingProcessNew"/>
     <dgm:cxn modelId="{71A45448-C64C-4F4E-9531-9D43A44852EA}" type="presOf" srcId="{BEBCE441-F842-4A6A-820E-149A1968DE5D}" destId="{FD82033A-2436-4A25-88FB-E3CE590284E7}" srcOrd="0" destOrd="0" presId="urn:microsoft.com/office/officeart/2016/7/layout/RepeatingBendingProcessNew"/>
+    <dgm:cxn modelId="{5B945B4F-3A49-4351-A7F7-794FB81E0E9C}" type="presOf" srcId="{A68A372A-98E1-4FDA-824E-560DB74C1AA1}" destId="{62475E7D-BAFD-4B46-A4E0-2772168475B7}" srcOrd="1" destOrd="0" presId="urn:microsoft.com/office/officeart/2016/7/layout/RepeatingBendingProcessNew"/>
     <dgm:cxn modelId="{84AABB69-2BB6-4D54-8E7B-2FB599528A21}" type="presOf" srcId="{B07A8FE4-395B-4FD2-93A0-BFAE3F7244B7}" destId="{E43128C5-3825-463F-A048-D91D40EF10DF}" srcOrd="1" destOrd="0" presId="urn:microsoft.com/office/officeart/2016/7/layout/RepeatingBendingProcessNew"/>
-    <dgm:cxn modelId="{5B945B4F-3A49-4351-A7F7-794FB81E0E9C}" type="presOf" srcId="{A68A372A-98E1-4FDA-824E-560DB74C1AA1}" destId="{62475E7D-BAFD-4B46-A4E0-2772168475B7}" srcOrd="1" destOrd="0" presId="urn:microsoft.com/office/officeart/2016/7/layout/RepeatingBendingProcessNew"/>
     <dgm:cxn modelId="{69A0007A-BA60-4783-99ED-3E9FC12B6DD8}" type="presOf" srcId="{1847CCB1-9D40-4778-8597-160BA56BF5A9}" destId="{183563B5-AC58-4FF7-9601-F54EF260E415}" srcOrd="0" destOrd="0" presId="urn:microsoft.com/office/officeart/2016/7/layout/RepeatingBendingProcessNew"/>
     <dgm:cxn modelId="{0D741781-3AB6-41DA-8C61-E83D41942329}" srcId="{F645428E-C088-46E6-A5FF-A8C10F537D1A}" destId="{39BE1579-2C14-48A7-900F-0B30E78C2F82}" srcOrd="2" destOrd="0" parTransId="{3F9FEA6A-3931-481C-925C-FF9C98C4A220}" sibTransId="{BEBCE441-F842-4A6A-820E-149A1968DE5D}"/>
     <dgm:cxn modelId="{49D31588-A2F4-4541-BC2A-D4C250AFA77D}" type="presOf" srcId="{BBE23391-9E24-45BC-AD78-0FDA39310C9C}" destId="{DC70BAD8-06FC-46EE-A891-CC755F09CD26}" srcOrd="0" destOrd="0" presId="urn:microsoft.com/office/officeart/2016/7/layout/RepeatingBendingProcessNew"/>
@@ -3618,7 +3623,7 @@
           <a:p>
             <a:fld id="{28B6BEF8-8BAD-43B4-88AC-B27EA08F9DA4}" type="datetimeFigureOut">
               <a:rPr lang="fr-BE" smtClean="0"/>
-              <a:t>08-12-25</a:t>
+              <a:t>9/12/25</a:t>
             </a:fld>
             <a:endParaRPr lang="fr-BE"/>
           </a:p>
@@ -3777,7 +3782,7 @@
           <a:p>
             <a:fld id="{E6F6D7A5-C704-4A31-B443-8A93F510AB53}" type="slidenum">
               <a:rPr lang="fr-BE" smtClean="0"/>
-              <a:t>‹N°›</a:t>
+              <a:t>‹#›</a:t>
             </a:fld>
             <a:endParaRPr lang="fr-BE"/>
           </a:p>
@@ -4631,7 +4636,7 @@
           <a:p>
             <a:fld id="{877969D3-4B31-4FD3-8EB6-33BF46695758}" type="datetime1">
               <a:rPr lang="fr-BE" smtClean="0"/>
-              <a:t>08-12-25</a:t>
+              <a:t>9/12/25</a:t>
             </a:fld>
             <a:endParaRPr lang="fr-BE"/>
           </a:p>
@@ -4673,7 +4678,7 @@
           <a:p>
             <a:fld id="{C32E571E-318C-4494-90AB-C77229247310}" type="slidenum">
               <a:rPr lang="fr-BE" smtClean="0"/>
-              <a:t>‹N°›</a:t>
+              <a:t>‹#›</a:t>
             </a:fld>
             <a:endParaRPr lang="fr-BE"/>
           </a:p>
@@ -4882,7 +4887,7 @@
           <a:p>
             <a:fld id="{0DA4C765-21FA-42E3-B0C3-3529E5C723B8}" type="datetime1">
               <a:rPr lang="fr-BE" smtClean="0"/>
-              <a:t>08-12-25</a:t>
+              <a:t>9/12/25</a:t>
             </a:fld>
             <a:endParaRPr lang="fr-BE"/>
           </a:p>
@@ -4924,7 +4929,7 @@
           <a:p>
             <a:fld id="{C32E571E-318C-4494-90AB-C77229247310}" type="slidenum">
               <a:rPr lang="fr-BE" smtClean="0"/>
-              <a:t>‹N°›</a:t>
+              <a:t>‹#›</a:t>
             </a:fld>
             <a:endParaRPr lang="fr-BE"/>
           </a:p>
@@ -5196,7 +5201,7 @@
           <a:p>
             <a:fld id="{A8B6A3E9-6648-4939-9A17-DDEFE99C92FB}" type="datetime1">
               <a:rPr lang="fr-BE" smtClean="0"/>
-              <a:t>08-12-25</a:t>
+              <a:t>9/12/25</a:t>
             </a:fld>
             <a:endParaRPr lang="fr-BE"/>
           </a:p>
@@ -5238,7 +5243,7 @@
           <a:p>
             <a:fld id="{C32E571E-318C-4494-90AB-C77229247310}" type="slidenum">
               <a:rPr lang="fr-BE" smtClean="0"/>
-              <a:t>‹N°›</a:t>
+              <a:t>‹#›</a:t>
             </a:fld>
             <a:endParaRPr lang="fr-BE"/>
           </a:p>
@@ -5529,7 +5534,7 @@
           <a:p>
             <a:fld id="{415DDA8D-02B1-488D-A903-6E38DB0EBC6E}" type="datetime1">
               <a:rPr lang="fr-BE" smtClean="0"/>
-              <a:t>08-12-25</a:t>
+              <a:t>9/12/25</a:t>
             </a:fld>
             <a:endParaRPr lang="fr-BE"/>
           </a:p>
@@ -5571,7 +5576,7 @@
           <a:p>
             <a:fld id="{C32E571E-318C-4494-90AB-C77229247310}" type="slidenum">
               <a:rPr lang="fr-BE" smtClean="0"/>
-              <a:t>‹N°›</a:t>
+              <a:t>‹#›</a:t>
             </a:fld>
             <a:endParaRPr lang="fr-BE"/>
           </a:p>
@@ -5843,7 +5848,7 @@
           <a:p>
             <a:fld id="{79B4DA75-F535-45DE-8E16-E4FFF7A79C2C}" type="datetime1">
               <a:rPr lang="fr-BE" smtClean="0"/>
-              <a:t>08-12-25</a:t>
+              <a:t>9/12/25</a:t>
             </a:fld>
             <a:endParaRPr lang="fr-BE"/>
           </a:p>
@@ -5885,7 +5890,7 @@
           <a:p>
             <a:fld id="{C32E571E-318C-4494-90AB-C77229247310}" type="slidenum">
               <a:rPr lang="fr-BE" smtClean="0"/>
-              <a:t>‹N°›</a:t>
+              <a:t>‹#›</a:t>
             </a:fld>
             <a:endParaRPr lang="fr-BE"/>
           </a:p>
@@ -6236,7 +6241,7 @@
           <a:p>
             <a:fld id="{9BC559BB-F8BF-4135-840B-A1C3627A35EF}" type="datetime1">
               <a:rPr lang="fr-BE" smtClean="0"/>
-              <a:t>08-12-25</a:t>
+              <a:t>9/12/25</a:t>
             </a:fld>
             <a:endParaRPr lang="fr-BE"/>
           </a:p>
@@ -6278,7 +6283,7 @@
           <a:p>
             <a:fld id="{C32E571E-318C-4494-90AB-C77229247310}" type="slidenum">
               <a:rPr lang="fr-BE" smtClean="0"/>
-              <a:t>‹N°›</a:t>
+              <a:t>‹#›</a:t>
             </a:fld>
             <a:endParaRPr lang="fr-BE"/>
           </a:p>
@@ -6406,7 +6411,7 @@
           <a:p>
             <a:fld id="{311715D2-6A58-422A-81C4-A16FDD6F7619}" type="datetime1">
               <a:rPr lang="fr-BE" smtClean="0"/>
-              <a:t>08-12-25</a:t>
+              <a:t>9/12/25</a:t>
             </a:fld>
             <a:endParaRPr lang="fr-BE"/>
           </a:p>
@@ -6448,7 +6453,7 @@
           <a:p>
             <a:fld id="{C32E571E-318C-4494-90AB-C77229247310}" type="slidenum">
               <a:rPr lang="fr-BE" smtClean="0"/>
-              <a:t>‹N°›</a:t>
+              <a:t>‹#›</a:t>
             </a:fld>
             <a:endParaRPr lang="fr-BE"/>
           </a:p>
@@ -6586,7 +6591,7 @@
           <a:p>
             <a:fld id="{9852A417-048A-41A8-B0DD-04B44660397C}" type="datetime1">
               <a:rPr lang="fr-BE" smtClean="0"/>
-              <a:t>08-12-25</a:t>
+              <a:t>9/12/25</a:t>
             </a:fld>
             <a:endParaRPr lang="fr-BE"/>
           </a:p>
@@ -6628,7 +6633,7 @@
           <a:p>
             <a:fld id="{C32E571E-318C-4494-90AB-C77229247310}" type="slidenum">
               <a:rPr lang="fr-BE" smtClean="0"/>
-              <a:t>‹N°›</a:t>
+              <a:t>‹#›</a:t>
             </a:fld>
             <a:endParaRPr lang="fr-BE"/>
           </a:p>
@@ -6756,7 +6761,7 @@
           <a:p>
             <a:fld id="{EB4C4A6D-714E-4D7C-9231-7589EF77630D}" type="datetime1">
               <a:rPr lang="fr-BE" smtClean="0"/>
-              <a:t>08-12-25</a:t>
+              <a:t>9/12/25</a:t>
             </a:fld>
             <a:endParaRPr lang="fr-BE"/>
           </a:p>
@@ -6798,7 +6803,7 @@
           <a:p>
             <a:fld id="{C32E571E-318C-4494-90AB-C77229247310}" type="slidenum">
               <a:rPr lang="fr-BE" smtClean="0"/>
-              <a:t>‹N°›</a:t>
+              <a:t>‹#›</a:t>
             </a:fld>
             <a:endParaRPr lang="fr-BE"/>
           </a:p>
@@ -7003,7 +7008,7 @@
           <a:p>
             <a:fld id="{CA079B5B-D020-4072-AB4F-A6C689DE3DB4}" type="datetime1">
               <a:rPr lang="fr-BE" smtClean="0"/>
-              <a:t>08-12-25</a:t>
+              <a:t>9/12/25</a:t>
             </a:fld>
             <a:endParaRPr lang="fr-BE"/>
           </a:p>
@@ -7045,7 +7050,7 @@
           <a:p>
             <a:fld id="{C32E571E-318C-4494-90AB-C77229247310}" type="slidenum">
               <a:rPr lang="fr-BE" smtClean="0"/>
-              <a:t>‹N°›</a:t>
+              <a:t>‹#›</a:t>
             </a:fld>
             <a:endParaRPr lang="fr-BE"/>
           </a:p>
@@ -7235,7 +7240,7 @@
           <a:p>
             <a:fld id="{02C18EB2-AC13-4EEF-890E-6C59EBFDC388}" type="datetime1">
               <a:rPr lang="fr-BE" smtClean="0"/>
-              <a:t>08-12-25</a:t>
+              <a:t>9/12/25</a:t>
             </a:fld>
             <a:endParaRPr lang="fr-BE"/>
           </a:p>
@@ -7277,7 +7282,7 @@
           <a:p>
             <a:fld id="{C32E571E-318C-4494-90AB-C77229247310}" type="slidenum">
               <a:rPr lang="fr-BE" smtClean="0"/>
-              <a:t>‹N°›</a:t>
+              <a:t>‹#›</a:t>
             </a:fld>
             <a:endParaRPr lang="fr-BE"/>
           </a:p>
@@ -7609,7 +7614,7 @@
           <a:p>
             <a:fld id="{CAB43D07-984F-4FD3-9346-8D0E1F9E72AE}" type="datetime1">
               <a:rPr lang="fr-BE" smtClean="0"/>
-              <a:t>08-12-25</a:t>
+              <a:t>9/12/25</a:t>
             </a:fld>
             <a:endParaRPr lang="fr-BE"/>
           </a:p>
@@ -7651,7 +7656,7 @@
           <a:p>
             <a:fld id="{C32E571E-318C-4494-90AB-C77229247310}" type="slidenum">
               <a:rPr lang="fr-BE" smtClean="0"/>
-              <a:t>‹N°›</a:t>
+              <a:t>‹#›</a:t>
             </a:fld>
             <a:endParaRPr lang="fr-BE"/>
           </a:p>
@@ -7732,7 +7737,7 @@
           <a:p>
             <a:fld id="{E681DF6E-8A8B-4992-8177-6BA5667CEC36}" type="datetime1">
               <a:rPr lang="fr-BE" smtClean="0"/>
-              <a:t>08-12-25</a:t>
+              <a:t>9/12/25</a:t>
             </a:fld>
             <a:endParaRPr lang="fr-BE"/>
           </a:p>
@@ -7774,7 +7779,7 @@
           <a:p>
             <a:fld id="{C32E571E-318C-4494-90AB-C77229247310}" type="slidenum">
               <a:rPr lang="fr-BE" smtClean="0"/>
-              <a:t>‹N°›</a:t>
+              <a:t>‹#›</a:t>
             </a:fld>
             <a:endParaRPr lang="fr-BE"/>
           </a:p>
@@ -7827,7 +7832,7 @@
           <a:p>
             <a:fld id="{FE1159AE-22AF-4007-B43B-E7C867608387}" type="datetime1">
               <a:rPr lang="fr-BE" smtClean="0"/>
-              <a:t>08-12-25</a:t>
+              <a:t>9/12/25</a:t>
             </a:fld>
             <a:endParaRPr lang="fr-BE"/>
           </a:p>
@@ -7869,7 +7874,7 @@
           <a:p>
             <a:fld id="{C32E571E-318C-4494-90AB-C77229247310}" type="slidenum">
               <a:rPr lang="fr-BE" smtClean="0"/>
-              <a:t>‹N°›</a:t>
+              <a:t>‹#›</a:t>
             </a:fld>
             <a:endParaRPr lang="fr-BE"/>
           </a:p>
@@ -8082,7 +8087,7 @@
           <a:p>
             <a:fld id="{4536AD6C-AD13-4902-930C-147DA72118D4}" type="datetime1">
               <a:rPr lang="fr-BE" smtClean="0"/>
-              <a:t>08-12-25</a:t>
+              <a:t>9/12/25</a:t>
             </a:fld>
             <a:endParaRPr lang="fr-BE"/>
           </a:p>
@@ -8124,7 +8129,7 @@
           <a:p>
             <a:fld id="{C32E571E-318C-4494-90AB-C77229247310}" type="slidenum">
               <a:rPr lang="fr-BE" smtClean="0"/>
-              <a:t>‹N°›</a:t>
+              <a:t>‹#›</a:t>
             </a:fld>
             <a:endParaRPr lang="fr-BE"/>
           </a:p>
@@ -8364,7 +8369,7 @@
           <a:p>
             <a:fld id="{C32E571E-318C-4494-90AB-C77229247310}" type="slidenum">
               <a:rPr lang="fr-BE" smtClean="0"/>
-              <a:t>‹N°›</a:t>
+              <a:t>‹#›</a:t>
             </a:fld>
             <a:endParaRPr lang="fr-BE"/>
           </a:p>
@@ -8387,7 +8392,7 @@
           <a:p>
             <a:fld id="{7D97F832-2685-4D04-B3EA-7EA0FCF785E6}" type="datetime1">
               <a:rPr lang="fr-BE" smtClean="0"/>
-              <a:t>08-12-25</a:t>
+              <a:t>9/12/25</a:t>
             </a:fld>
             <a:endParaRPr lang="fr-BE"/>
           </a:p>
@@ -9145,7 +9150,7 @@
           <a:p>
             <a:fld id="{AC8EFBF8-83ED-47ED-A938-F9AD9DA122D2}" type="datetime1">
               <a:rPr lang="fr-BE" smtClean="0"/>
-              <a:t>08-12-25</a:t>
+              <a:t>9/12/25</a:t>
             </a:fld>
             <a:endParaRPr lang="fr-BE"/>
           </a:p>
@@ -9221,7 +9226,7 @@
           <a:p>
             <a:fld id="{C32E571E-318C-4494-90AB-C77229247310}" type="slidenum">
               <a:rPr lang="fr-BE" smtClean="0"/>
-              <a:t>‹N°›</a:t>
+              <a:t>‹#›</a:t>
             </a:fld>
             <a:endParaRPr lang="fr-BE"/>
           </a:p>
@@ -11097,13 +11102,13 @@
   <p:clrMapOvr>
     <a:masterClrMapping/>
   </p:clrMapOvr>
-  <mc:AlternateContent xmlns:mc="http://schemas.openxmlformats.org/markup-compatibility/2006">
-    <mc:Choice xmlns:p159="http://schemas.microsoft.com/office/powerpoint/2015/09/main" Requires="p159">
+  <mc:AlternateContent xmlns:mc="http://schemas.openxmlformats.org/markup-compatibility/2006" xmlns:p159="http://schemas.microsoft.com/office/powerpoint/2015/09/main">
+    <mc:Choice Requires="p159">
       <p:transition xmlns:p14="http://schemas.microsoft.com/office/powerpoint/2010/main" spd="slow" p14:dur="2000">
         <p159:morph option="byObject"/>
       </p:transition>
     </mc:Choice>
-    <mc:Fallback>
+    <mc:Fallback xmlns="">
       <p:transition spd="slow">
         <p:fade/>
       </p:transition>
@@ -11402,13 +11407,13 @@
   <p:clrMapOvr>
     <a:masterClrMapping/>
   </p:clrMapOvr>
-  <mc:AlternateContent xmlns:mc="http://schemas.openxmlformats.org/markup-compatibility/2006">
-    <mc:Choice xmlns:p159="http://schemas.microsoft.com/office/powerpoint/2015/09/main" Requires="p159">
+  <mc:AlternateContent xmlns:mc="http://schemas.openxmlformats.org/markup-compatibility/2006" xmlns:p159="http://schemas.microsoft.com/office/powerpoint/2015/09/main">
+    <mc:Choice Requires="p159">
       <p:transition xmlns:p14="http://schemas.microsoft.com/office/powerpoint/2010/main" spd="slow" p14:dur="2000">
         <p159:morph option="byObject"/>
       </p:transition>
     </mc:Choice>
-    <mc:Fallback>
+    <mc:Fallback xmlns="">
       <p:transition spd="slow">
         <p:fade/>
       </p:transition>
@@ -11738,13 +11743,13 @@
   <p:clrMapOvr>
     <a:masterClrMapping/>
   </p:clrMapOvr>
-  <mc:AlternateContent xmlns:mc="http://schemas.openxmlformats.org/markup-compatibility/2006">
-    <mc:Choice xmlns:p159="http://schemas.microsoft.com/office/powerpoint/2015/09/main" Requires="p159">
+  <mc:AlternateContent xmlns:mc="http://schemas.openxmlformats.org/markup-compatibility/2006" xmlns:p159="http://schemas.microsoft.com/office/powerpoint/2015/09/main">
+    <mc:Choice Requires="p159">
       <p:transition xmlns:p14="http://schemas.microsoft.com/office/powerpoint/2010/main" spd="slow" p14:dur="2000">
         <p159:morph option="byObject"/>
       </p:transition>
     </mc:Choice>
-    <mc:Fallback>
+    <mc:Fallback xmlns="">
       <p:transition spd="slow">
         <p:fade/>
       </p:transition>
@@ -12459,13 +12464,13 @@
   <p:clrMapOvr>
     <a:masterClrMapping/>
   </p:clrMapOvr>
-  <mc:AlternateContent xmlns:mc="http://schemas.openxmlformats.org/markup-compatibility/2006">
-    <mc:Choice xmlns:p159="http://schemas.microsoft.com/office/powerpoint/2015/09/main" Requires="p159">
+  <mc:AlternateContent xmlns:mc="http://schemas.openxmlformats.org/markup-compatibility/2006" xmlns:p159="http://schemas.microsoft.com/office/powerpoint/2015/09/main">
+    <mc:Choice Requires="p159">
       <p:transition xmlns:p14="http://schemas.microsoft.com/office/powerpoint/2010/main" spd="slow" p14:dur="2000">
         <p159:morph option="byObject"/>
       </p:transition>
     </mc:Choice>
-    <mc:Fallback>
+    <mc:Fallback xmlns="">
       <p:transition spd="slow">
         <p:fade/>
       </p:transition>
@@ -13109,13 +13114,13 @@
   <p:clrMapOvr>
     <a:masterClrMapping/>
   </p:clrMapOvr>
-  <mc:AlternateContent xmlns:mc="http://schemas.openxmlformats.org/markup-compatibility/2006">
-    <mc:Choice xmlns:p14="http://schemas.microsoft.com/office/powerpoint/2010/main" Requires="p14">
+  <mc:AlternateContent xmlns:mc="http://schemas.openxmlformats.org/markup-compatibility/2006" xmlns:p14="http://schemas.microsoft.com/office/powerpoint/2010/main">
+    <mc:Choice Requires="p14">
       <p:transition spd="med" p14:dur="700">
         <p:fade/>
       </p:transition>
     </mc:Choice>
-    <mc:Fallback>
+    <mc:Fallback xmlns="">
       <p:transition spd="med">
         <p:fade/>
       </p:transition>
@@ -13487,13 +13492,13 @@
   <p:clrMapOvr>
     <a:masterClrMapping/>
   </p:clrMapOvr>
-  <mc:AlternateContent xmlns:mc="http://schemas.openxmlformats.org/markup-compatibility/2006">
-    <mc:Choice xmlns:p159="http://schemas.microsoft.com/office/powerpoint/2015/09/main" Requires="p159">
+  <mc:AlternateContent xmlns:mc="http://schemas.openxmlformats.org/markup-compatibility/2006" xmlns:p159="http://schemas.microsoft.com/office/powerpoint/2015/09/main">
+    <mc:Choice Requires="p159">
       <p:transition xmlns:p14="http://schemas.microsoft.com/office/powerpoint/2010/main" spd="slow" p14:dur="2000">
         <p159:morph option="byObject"/>
       </p:transition>
     </mc:Choice>
-    <mc:Fallback>
+    <mc:Fallback xmlns="">
       <p:transition spd="slow">
         <p:fade/>
       </p:transition>
@@ -13835,13 +13840,13 @@
   <p:clrMapOvr>
     <a:masterClrMapping/>
   </p:clrMapOvr>
-  <mc:AlternateContent xmlns:mc="http://schemas.openxmlformats.org/markup-compatibility/2006">
-    <mc:Choice xmlns:p159="http://schemas.microsoft.com/office/powerpoint/2015/09/main" Requires="p159">
+  <mc:AlternateContent xmlns:mc="http://schemas.openxmlformats.org/markup-compatibility/2006" xmlns:p159="http://schemas.microsoft.com/office/powerpoint/2015/09/main">
+    <mc:Choice Requires="p159">
       <p:transition xmlns:p14="http://schemas.microsoft.com/office/powerpoint/2010/main" spd="slow" p14:dur="2000">
         <p159:morph option="byObject"/>
       </p:transition>
     </mc:Choice>
-    <mc:Fallback>
+    <mc:Fallback xmlns="">
       <p:transition spd="slow">
         <p:fade/>
       </p:transition>
@@ -14177,13 +14182,13 @@
   <p:clrMapOvr>
     <a:masterClrMapping/>
   </p:clrMapOvr>
-  <mc:AlternateContent xmlns:mc="http://schemas.openxmlformats.org/markup-compatibility/2006">
-    <mc:Choice xmlns:p159="http://schemas.microsoft.com/office/powerpoint/2015/09/main" Requires="p159">
+  <mc:AlternateContent xmlns:mc="http://schemas.openxmlformats.org/markup-compatibility/2006" xmlns:p159="http://schemas.microsoft.com/office/powerpoint/2015/09/main">
+    <mc:Choice Requires="p159">
       <p:transition xmlns:p14="http://schemas.microsoft.com/office/powerpoint/2010/main" spd="slow" p14:dur="2000">
         <p159:morph option="byObject"/>
       </p:transition>
     </mc:Choice>
-    <mc:Fallback>
+    <mc:Fallback xmlns="">
       <p:transition spd="slow">
         <p:fade/>
       </p:transition>
@@ -14497,13 +14502,13 @@
   <p:clrMapOvr>
     <a:masterClrMapping/>
   </p:clrMapOvr>
-  <mc:AlternateContent xmlns:mc="http://schemas.openxmlformats.org/markup-compatibility/2006">
-    <mc:Choice xmlns:p159="http://schemas.microsoft.com/office/powerpoint/2015/09/main" Requires="p159">
+  <mc:AlternateContent xmlns:mc="http://schemas.openxmlformats.org/markup-compatibility/2006" xmlns:p159="http://schemas.microsoft.com/office/powerpoint/2015/09/main">
+    <mc:Choice Requires="p159">
       <p:transition xmlns:p14="http://schemas.microsoft.com/office/powerpoint/2010/main" spd="slow" p14:dur="2000">
         <p159:morph option="byObject"/>
       </p:transition>
     </mc:Choice>
-    <mc:Fallback>
+    <mc:Fallback xmlns="">
       <p:transition spd="slow">
         <p:fade/>
       </p:transition>
@@ -14746,7 +14751,7 @@
             </a:pPr>
             <a:r>
               <a:rPr lang="en-US" i="1" dirty="0"/>
-              <a:t>It is assumed that the synchronization of the data from both sensors will be challenging.</a:t>
+              <a:t>The synchronization of the data from both sensors has been challenging.</a:t>
             </a:r>
           </a:p>
           <a:p>
@@ -14767,30 +14772,27 @@
           <a:p>
             <a:r>
               <a:rPr lang="en-US" i="1" dirty="0"/>
-              <a:t>the vibration motors have temporarily been replaced with LEDs for testing purposes due to a voltage issue.</a:t>
+              <a:t>The vibration motors have temporarily been replaced with LEDs for testing purposes due to a voltage issue.</a:t>
             </a:r>
           </a:p>
           <a:p>
             <a:endParaRPr lang="en-US" dirty="0"/>
           </a:p>
           <a:p>
-            <a:r>
-              <a:rPr lang="en-US" b="1" dirty="0">
-                <a:sym typeface="Wingdings" panose="05000000000000000000" pitchFamily="2" charset="2"/>
-              </a:rPr>
-              <a:t></a:t>
-            </a:r>
+            <a:pPr marL="285750" indent="-285750">
+              <a:buFont typeface="Wingdings" pitchFamily="2" charset="2"/>
+              <a:buChar char="à"/>
+            </a:pPr>
             <a:r>
               <a:rPr lang="en-US" b="1" dirty="0"/>
-              <a:t> Features not yet implemented :</a:t>
+              <a:t>No environment tests were conducted:</a:t>
             </a:r>
           </a:p>
           <a:p>
             <a:r>
               <a:rPr lang="en-US" i="1" dirty="0"/>
-              <a:t>The current version of the code only implements the audio processing part, while the video processing are yet to be implemented.</a:t>
-            </a:r>
-            <a:endParaRPr lang="en-US" dirty="0"/>
+              <a:t>Due to limited time, even though the device is still a prototype and tuning the code parameters could have significantly improved the user experience.</a:t>
+            </a:r>
           </a:p>
           <a:p>
             <a:pPr>
@@ -14846,13 +14848,13 @@
   <p:clrMapOvr>
     <a:masterClrMapping/>
   </p:clrMapOvr>
-  <mc:AlternateContent xmlns:mc="http://schemas.openxmlformats.org/markup-compatibility/2006">
-    <mc:Choice xmlns:p159="http://schemas.microsoft.com/office/powerpoint/2015/09/main" Requires="p159">
+  <mc:AlternateContent xmlns:mc="http://schemas.openxmlformats.org/markup-compatibility/2006" xmlns:p159="http://schemas.microsoft.com/office/powerpoint/2015/09/main">
+    <mc:Choice Requires="p159">
       <p:transition xmlns:p14="http://schemas.microsoft.com/office/powerpoint/2010/main" spd="slow" p14:dur="2000">
         <p159:morph option="byObject"/>
       </p:transition>
     </mc:Choice>
-    <mc:Fallback>
+    <mc:Fallback xmlns="">
       <p:transition spd="slow">
         <p:fade/>
       </p:transition>

</xml_diff>

<commit_message>
refactor: simplifier la gestion des files d'attente et ajouter un reset matériel pour la caméra RealSense
</commit_message>
<xml_diff>
--- a/doc/Advanced Human Machine.pptx
+++ b/doc/Advanced Human Machine.pptx
@@ -3782,7 +3782,7 @@
           <a:p>
             <a:fld id="{E6F6D7A5-C704-4A31-B443-8A93F510AB53}" type="slidenum">
               <a:rPr lang="fr-BE" smtClean="0"/>
-              <a:t>‹#›</a:t>
+              <a:t>‹N°›</a:t>
             </a:fld>
             <a:endParaRPr lang="fr-BE"/>
           </a:p>
@@ -4678,7 +4678,7 @@
           <a:p>
             <a:fld id="{C32E571E-318C-4494-90AB-C77229247310}" type="slidenum">
               <a:rPr lang="fr-BE" smtClean="0"/>
-              <a:t>‹#›</a:t>
+              <a:t>‹N°›</a:t>
             </a:fld>
             <a:endParaRPr lang="fr-BE"/>
           </a:p>
@@ -4929,7 +4929,7 @@
           <a:p>
             <a:fld id="{C32E571E-318C-4494-90AB-C77229247310}" type="slidenum">
               <a:rPr lang="fr-BE" smtClean="0"/>
-              <a:t>‹#›</a:t>
+              <a:t>‹N°›</a:t>
             </a:fld>
             <a:endParaRPr lang="fr-BE"/>
           </a:p>
@@ -5243,7 +5243,7 @@
           <a:p>
             <a:fld id="{C32E571E-318C-4494-90AB-C77229247310}" type="slidenum">
               <a:rPr lang="fr-BE" smtClean="0"/>
-              <a:t>‹#›</a:t>
+              <a:t>‹N°›</a:t>
             </a:fld>
             <a:endParaRPr lang="fr-BE"/>
           </a:p>
@@ -5576,7 +5576,7 @@
           <a:p>
             <a:fld id="{C32E571E-318C-4494-90AB-C77229247310}" type="slidenum">
               <a:rPr lang="fr-BE" smtClean="0"/>
-              <a:t>‹#›</a:t>
+              <a:t>‹N°›</a:t>
             </a:fld>
             <a:endParaRPr lang="fr-BE"/>
           </a:p>
@@ -5890,7 +5890,7 @@
           <a:p>
             <a:fld id="{C32E571E-318C-4494-90AB-C77229247310}" type="slidenum">
               <a:rPr lang="fr-BE" smtClean="0"/>
-              <a:t>‹#›</a:t>
+              <a:t>‹N°›</a:t>
             </a:fld>
             <a:endParaRPr lang="fr-BE"/>
           </a:p>
@@ -6283,7 +6283,7 @@
           <a:p>
             <a:fld id="{C32E571E-318C-4494-90AB-C77229247310}" type="slidenum">
               <a:rPr lang="fr-BE" smtClean="0"/>
-              <a:t>‹#›</a:t>
+              <a:t>‹N°›</a:t>
             </a:fld>
             <a:endParaRPr lang="fr-BE"/>
           </a:p>
@@ -6453,7 +6453,7 @@
           <a:p>
             <a:fld id="{C32E571E-318C-4494-90AB-C77229247310}" type="slidenum">
               <a:rPr lang="fr-BE" smtClean="0"/>
-              <a:t>‹#›</a:t>
+              <a:t>‹N°›</a:t>
             </a:fld>
             <a:endParaRPr lang="fr-BE"/>
           </a:p>
@@ -6633,7 +6633,7 @@
           <a:p>
             <a:fld id="{C32E571E-318C-4494-90AB-C77229247310}" type="slidenum">
               <a:rPr lang="fr-BE" smtClean="0"/>
-              <a:t>‹#›</a:t>
+              <a:t>‹N°›</a:t>
             </a:fld>
             <a:endParaRPr lang="fr-BE"/>
           </a:p>
@@ -6803,7 +6803,7 @@
           <a:p>
             <a:fld id="{C32E571E-318C-4494-90AB-C77229247310}" type="slidenum">
               <a:rPr lang="fr-BE" smtClean="0"/>
-              <a:t>‹#›</a:t>
+              <a:t>‹N°›</a:t>
             </a:fld>
             <a:endParaRPr lang="fr-BE"/>
           </a:p>
@@ -7050,7 +7050,7 @@
           <a:p>
             <a:fld id="{C32E571E-318C-4494-90AB-C77229247310}" type="slidenum">
               <a:rPr lang="fr-BE" smtClean="0"/>
-              <a:t>‹#›</a:t>
+              <a:t>‹N°›</a:t>
             </a:fld>
             <a:endParaRPr lang="fr-BE"/>
           </a:p>
@@ -7282,7 +7282,7 @@
           <a:p>
             <a:fld id="{C32E571E-318C-4494-90AB-C77229247310}" type="slidenum">
               <a:rPr lang="fr-BE" smtClean="0"/>
-              <a:t>‹#›</a:t>
+              <a:t>‹N°›</a:t>
             </a:fld>
             <a:endParaRPr lang="fr-BE"/>
           </a:p>
@@ -7656,7 +7656,7 @@
           <a:p>
             <a:fld id="{C32E571E-318C-4494-90AB-C77229247310}" type="slidenum">
               <a:rPr lang="fr-BE" smtClean="0"/>
-              <a:t>‹#›</a:t>
+              <a:t>‹N°›</a:t>
             </a:fld>
             <a:endParaRPr lang="fr-BE"/>
           </a:p>
@@ -7779,7 +7779,7 @@
           <a:p>
             <a:fld id="{C32E571E-318C-4494-90AB-C77229247310}" type="slidenum">
               <a:rPr lang="fr-BE" smtClean="0"/>
-              <a:t>‹#›</a:t>
+              <a:t>‹N°›</a:t>
             </a:fld>
             <a:endParaRPr lang="fr-BE"/>
           </a:p>
@@ -7874,7 +7874,7 @@
           <a:p>
             <a:fld id="{C32E571E-318C-4494-90AB-C77229247310}" type="slidenum">
               <a:rPr lang="fr-BE" smtClean="0"/>
-              <a:t>‹#›</a:t>
+              <a:t>‹N°›</a:t>
             </a:fld>
             <a:endParaRPr lang="fr-BE"/>
           </a:p>
@@ -8129,7 +8129,7 @@
           <a:p>
             <a:fld id="{C32E571E-318C-4494-90AB-C77229247310}" type="slidenum">
               <a:rPr lang="fr-BE" smtClean="0"/>
-              <a:t>‹#›</a:t>
+              <a:t>‹N°›</a:t>
             </a:fld>
             <a:endParaRPr lang="fr-BE"/>
           </a:p>
@@ -8369,7 +8369,7 @@
           <a:p>
             <a:fld id="{C32E571E-318C-4494-90AB-C77229247310}" type="slidenum">
               <a:rPr lang="fr-BE" smtClean="0"/>
-              <a:t>‹#›</a:t>
+              <a:t>‹N°›</a:t>
             </a:fld>
             <a:endParaRPr lang="fr-BE"/>
           </a:p>
@@ -9226,7 +9226,7 @@
           <a:p>
             <a:fld id="{C32E571E-318C-4494-90AB-C77229247310}" type="slidenum">
               <a:rPr lang="fr-BE" smtClean="0"/>
-              <a:t>‹#›</a:t>
+              <a:t>‹N°›</a:t>
             </a:fld>
             <a:endParaRPr lang="fr-BE"/>
           </a:p>
@@ -14772,8 +14772,21 @@
           <a:p>
             <a:r>
               <a:rPr lang="en-US" i="1" dirty="0"/>
-              <a:t>The vibration motors have temporarily been replaced with LEDs for testing purposes due to a voltage issue.</a:t>
-            </a:r>
+              <a:t>The vibration motors have temporarily been replaced with LEDs for testing purposes due to a voltage issue</a:t>
+            </a:r>
+            <a:r>
+              <a:rPr lang="en-US" i="1"/>
+              <a:t>. Problems </a:t>
+            </a:r>
+            <a:r>
+              <a:rPr lang="en-US" i="1" dirty="0"/>
+              <a:t>with </a:t>
+            </a:r>
+            <a:r>
+              <a:rPr lang="en-US" i="1"/>
+              <a:t>LEDs also.</a:t>
+            </a:r>
+            <a:endParaRPr lang="en-US" i="1" dirty="0"/>
           </a:p>
           <a:p>
             <a:endParaRPr lang="en-US" dirty="0"/>

</xml_diff>

<commit_message>
Revert "refactor: simplifier la gestion des files d'attente et ajouter un reset matériel pour la caméra RealSense"
This reverts commit 529ada18c4b2aa990266537ec3cf1ac0edfcdd9e.
</commit_message>
<xml_diff>
--- a/doc/Advanced Human Machine.pptx
+++ b/doc/Advanced Human Machine.pptx
@@ -3782,7 +3782,7 @@
           <a:p>
             <a:fld id="{E6F6D7A5-C704-4A31-B443-8A93F510AB53}" type="slidenum">
               <a:rPr lang="fr-BE" smtClean="0"/>
-              <a:t>‹N°›</a:t>
+              <a:t>‹#›</a:t>
             </a:fld>
             <a:endParaRPr lang="fr-BE"/>
           </a:p>
@@ -4678,7 +4678,7 @@
           <a:p>
             <a:fld id="{C32E571E-318C-4494-90AB-C77229247310}" type="slidenum">
               <a:rPr lang="fr-BE" smtClean="0"/>
-              <a:t>‹N°›</a:t>
+              <a:t>‹#›</a:t>
             </a:fld>
             <a:endParaRPr lang="fr-BE"/>
           </a:p>
@@ -4929,7 +4929,7 @@
           <a:p>
             <a:fld id="{C32E571E-318C-4494-90AB-C77229247310}" type="slidenum">
               <a:rPr lang="fr-BE" smtClean="0"/>
-              <a:t>‹N°›</a:t>
+              <a:t>‹#›</a:t>
             </a:fld>
             <a:endParaRPr lang="fr-BE"/>
           </a:p>
@@ -5243,7 +5243,7 @@
           <a:p>
             <a:fld id="{C32E571E-318C-4494-90AB-C77229247310}" type="slidenum">
               <a:rPr lang="fr-BE" smtClean="0"/>
-              <a:t>‹N°›</a:t>
+              <a:t>‹#›</a:t>
             </a:fld>
             <a:endParaRPr lang="fr-BE"/>
           </a:p>
@@ -5576,7 +5576,7 @@
           <a:p>
             <a:fld id="{C32E571E-318C-4494-90AB-C77229247310}" type="slidenum">
               <a:rPr lang="fr-BE" smtClean="0"/>
-              <a:t>‹N°›</a:t>
+              <a:t>‹#›</a:t>
             </a:fld>
             <a:endParaRPr lang="fr-BE"/>
           </a:p>
@@ -5890,7 +5890,7 @@
           <a:p>
             <a:fld id="{C32E571E-318C-4494-90AB-C77229247310}" type="slidenum">
               <a:rPr lang="fr-BE" smtClean="0"/>
-              <a:t>‹N°›</a:t>
+              <a:t>‹#›</a:t>
             </a:fld>
             <a:endParaRPr lang="fr-BE"/>
           </a:p>
@@ -6283,7 +6283,7 @@
           <a:p>
             <a:fld id="{C32E571E-318C-4494-90AB-C77229247310}" type="slidenum">
               <a:rPr lang="fr-BE" smtClean="0"/>
-              <a:t>‹N°›</a:t>
+              <a:t>‹#›</a:t>
             </a:fld>
             <a:endParaRPr lang="fr-BE"/>
           </a:p>
@@ -6453,7 +6453,7 @@
           <a:p>
             <a:fld id="{C32E571E-318C-4494-90AB-C77229247310}" type="slidenum">
               <a:rPr lang="fr-BE" smtClean="0"/>
-              <a:t>‹N°›</a:t>
+              <a:t>‹#›</a:t>
             </a:fld>
             <a:endParaRPr lang="fr-BE"/>
           </a:p>
@@ -6633,7 +6633,7 @@
           <a:p>
             <a:fld id="{C32E571E-318C-4494-90AB-C77229247310}" type="slidenum">
               <a:rPr lang="fr-BE" smtClean="0"/>
-              <a:t>‹N°›</a:t>
+              <a:t>‹#›</a:t>
             </a:fld>
             <a:endParaRPr lang="fr-BE"/>
           </a:p>
@@ -6803,7 +6803,7 @@
           <a:p>
             <a:fld id="{C32E571E-318C-4494-90AB-C77229247310}" type="slidenum">
               <a:rPr lang="fr-BE" smtClean="0"/>
-              <a:t>‹N°›</a:t>
+              <a:t>‹#›</a:t>
             </a:fld>
             <a:endParaRPr lang="fr-BE"/>
           </a:p>
@@ -7050,7 +7050,7 @@
           <a:p>
             <a:fld id="{C32E571E-318C-4494-90AB-C77229247310}" type="slidenum">
               <a:rPr lang="fr-BE" smtClean="0"/>
-              <a:t>‹N°›</a:t>
+              <a:t>‹#›</a:t>
             </a:fld>
             <a:endParaRPr lang="fr-BE"/>
           </a:p>
@@ -7282,7 +7282,7 @@
           <a:p>
             <a:fld id="{C32E571E-318C-4494-90AB-C77229247310}" type="slidenum">
               <a:rPr lang="fr-BE" smtClean="0"/>
-              <a:t>‹N°›</a:t>
+              <a:t>‹#›</a:t>
             </a:fld>
             <a:endParaRPr lang="fr-BE"/>
           </a:p>
@@ -7656,7 +7656,7 @@
           <a:p>
             <a:fld id="{C32E571E-318C-4494-90AB-C77229247310}" type="slidenum">
               <a:rPr lang="fr-BE" smtClean="0"/>
-              <a:t>‹N°›</a:t>
+              <a:t>‹#›</a:t>
             </a:fld>
             <a:endParaRPr lang="fr-BE"/>
           </a:p>
@@ -7779,7 +7779,7 @@
           <a:p>
             <a:fld id="{C32E571E-318C-4494-90AB-C77229247310}" type="slidenum">
               <a:rPr lang="fr-BE" smtClean="0"/>
-              <a:t>‹N°›</a:t>
+              <a:t>‹#›</a:t>
             </a:fld>
             <a:endParaRPr lang="fr-BE"/>
           </a:p>
@@ -7874,7 +7874,7 @@
           <a:p>
             <a:fld id="{C32E571E-318C-4494-90AB-C77229247310}" type="slidenum">
               <a:rPr lang="fr-BE" smtClean="0"/>
-              <a:t>‹N°›</a:t>
+              <a:t>‹#›</a:t>
             </a:fld>
             <a:endParaRPr lang="fr-BE"/>
           </a:p>
@@ -8129,7 +8129,7 @@
           <a:p>
             <a:fld id="{C32E571E-318C-4494-90AB-C77229247310}" type="slidenum">
               <a:rPr lang="fr-BE" smtClean="0"/>
-              <a:t>‹N°›</a:t>
+              <a:t>‹#›</a:t>
             </a:fld>
             <a:endParaRPr lang="fr-BE"/>
           </a:p>
@@ -8369,7 +8369,7 @@
           <a:p>
             <a:fld id="{C32E571E-318C-4494-90AB-C77229247310}" type="slidenum">
               <a:rPr lang="fr-BE" smtClean="0"/>
-              <a:t>‹N°›</a:t>
+              <a:t>‹#›</a:t>
             </a:fld>
             <a:endParaRPr lang="fr-BE"/>
           </a:p>
@@ -9226,7 +9226,7 @@
           <a:p>
             <a:fld id="{C32E571E-318C-4494-90AB-C77229247310}" type="slidenum">
               <a:rPr lang="fr-BE" smtClean="0"/>
-              <a:t>‹N°›</a:t>
+              <a:t>‹#›</a:t>
             </a:fld>
             <a:endParaRPr lang="fr-BE"/>
           </a:p>
@@ -14772,21 +14772,8 @@
           <a:p>
             <a:r>
               <a:rPr lang="en-US" i="1" dirty="0"/>
-              <a:t>The vibration motors have temporarily been replaced with LEDs for testing purposes due to a voltage issue</a:t>
-            </a:r>
-            <a:r>
-              <a:rPr lang="en-US" i="1"/>
-              <a:t>. Problems </a:t>
-            </a:r>
-            <a:r>
-              <a:rPr lang="en-US" i="1" dirty="0"/>
-              <a:t>with </a:t>
-            </a:r>
-            <a:r>
-              <a:rPr lang="en-US" i="1"/>
-              <a:t>LEDs also.</a:t>
-            </a:r>
-            <a:endParaRPr lang="en-US" i="1" dirty="0"/>
+              <a:t>The vibration motors have temporarily been replaced with LEDs for testing purposes due to a voltage issue.</a:t>
+            </a:r>
           </a:p>
           <a:p>
             <a:endParaRPr lang="en-US" dirty="0"/>

</xml_diff>